<commit_message>
modify folder name and change html route to make sure redirect path is at website
</commit_message>
<xml_diff>
--- a/architecture.pptx
+++ b/architecture.pptx
@@ -6,7 +6,6 @@
   </p:sldMasterIdLst>
   <p:sldIdLst>
     <p:sldId id="256" r:id="rId2"/>
-    <p:sldId id="257" r:id="rId3"/>
   </p:sldIdLst>
   <p:sldSz cx="12192000" cy="6858000"/>
   <p:notesSz cx="6858000" cy="9144000"/>
@@ -255,7 +254,7 @@
           <a:p>
             <a:fld id="{8C41A0D1-A457-449B-B194-FB943B17F770}" type="datetimeFigureOut">
               <a:rPr lang="zh-TW" altLang="en-US" smtClean="0"/>
-              <a:t>2023/1/26</a:t>
+              <a:t>2023/1/29</a:t>
             </a:fld>
             <a:endParaRPr lang="zh-TW" altLang="en-US"/>
           </a:p>
@@ -425,7 +424,7 @@
           <a:p>
             <a:fld id="{8C41A0D1-A457-449B-B194-FB943B17F770}" type="datetimeFigureOut">
               <a:rPr lang="zh-TW" altLang="en-US" smtClean="0"/>
-              <a:t>2023/1/26</a:t>
+              <a:t>2023/1/29</a:t>
             </a:fld>
             <a:endParaRPr lang="zh-TW" altLang="en-US"/>
           </a:p>
@@ -605,7 +604,7 @@
           <a:p>
             <a:fld id="{8C41A0D1-A457-449B-B194-FB943B17F770}" type="datetimeFigureOut">
               <a:rPr lang="zh-TW" altLang="en-US" smtClean="0"/>
-              <a:t>2023/1/26</a:t>
+              <a:t>2023/1/29</a:t>
             </a:fld>
             <a:endParaRPr lang="zh-TW" altLang="en-US"/>
           </a:p>
@@ -775,7 +774,7 @@
           <a:p>
             <a:fld id="{8C41A0D1-A457-449B-B194-FB943B17F770}" type="datetimeFigureOut">
               <a:rPr lang="zh-TW" altLang="en-US" smtClean="0"/>
-              <a:t>2023/1/26</a:t>
+              <a:t>2023/1/29</a:t>
             </a:fld>
             <a:endParaRPr lang="zh-TW" altLang="en-US"/>
           </a:p>
@@ -1021,7 +1020,7 @@
           <a:p>
             <a:fld id="{8C41A0D1-A457-449B-B194-FB943B17F770}" type="datetimeFigureOut">
               <a:rPr lang="zh-TW" altLang="en-US" smtClean="0"/>
-              <a:t>2023/1/26</a:t>
+              <a:t>2023/1/29</a:t>
             </a:fld>
             <a:endParaRPr lang="zh-TW" altLang="en-US"/>
           </a:p>
@@ -1253,7 +1252,7 @@
           <a:p>
             <a:fld id="{8C41A0D1-A457-449B-B194-FB943B17F770}" type="datetimeFigureOut">
               <a:rPr lang="zh-TW" altLang="en-US" smtClean="0"/>
-              <a:t>2023/1/26</a:t>
+              <a:t>2023/1/29</a:t>
             </a:fld>
             <a:endParaRPr lang="zh-TW" altLang="en-US"/>
           </a:p>
@@ -1620,7 +1619,7 @@
           <a:p>
             <a:fld id="{8C41A0D1-A457-449B-B194-FB943B17F770}" type="datetimeFigureOut">
               <a:rPr lang="zh-TW" altLang="en-US" smtClean="0"/>
-              <a:t>2023/1/26</a:t>
+              <a:t>2023/1/29</a:t>
             </a:fld>
             <a:endParaRPr lang="zh-TW" altLang="en-US"/>
           </a:p>
@@ -1738,7 +1737,7 @@
           <a:p>
             <a:fld id="{8C41A0D1-A457-449B-B194-FB943B17F770}" type="datetimeFigureOut">
               <a:rPr lang="zh-TW" altLang="en-US" smtClean="0"/>
-              <a:t>2023/1/26</a:t>
+              <a:t>2023/1/29</a:t>
             </a:fld>
             <a:endParaRPr lang="zh-TW" altLang="en-US"/>
           </a:p>
@@ -1833,7 +1832,7 @@
           <a:p>
             <a:fld id="{8C41A0D1-A457-449B-B194-FB943B17F770}" type="datetimeFigureOut">
               <a:rPr lang="zh-TW" altLang="en-US" smtClean="0"/>
-              <a:t>2023/1/26</a:t>
+              <a:t>2023/1/29</a:t>
             </a:fld>
             <a:endParaRPr lang="zh-TW" altLang="en-US"/>
           </a:p>
@@ -2110,7 +2109,7 @@
           <a:p>
             <a:fld id="{8C41A0D1-A457-449B-B194-FB943B17F770}" type="datetimeFigureOut">
               <a:rPr lang="zh-TW" altLang="en-US" smtClean="0"/>
-              <a:t>2023/1/26</a:t>
+              <a:t>2023/1/29</a:t>
             </a:fld>
             <a:endParaRPr lang="zh-TW" altLang="en-US"/>
           </a:p>
@@ -2363,7 +2362,7 @@
           <a:p>
             <a:fld id="{8C41A0D1-A457-449B-B194-FB943B17F770}" type="datetimeFigureOut">
               <a:rPr lang="zh-TW" altLang="en-US" smtClean="0"/>
-              <a:t>2023/1/26</a:t>
+              <a:t>2023/1/29</a:t>
             </a:fld>
             <a:endParaRPr lang="zh-TW" altLang="en-US"/>
           </a:p>
@@ -2576,7 +2575,7 @@
           <a:p>
             <a:fld id="{8C41A0D1-A457-449B-B194-FB943B17F770}" type="datetimeFigureOut">
               <a:rPr lang="zh-TW" altLang="en-US" smtClean="0"/>
-              <a:t>2023/1/26</a:t>
+              <a:t>2023/1/29</a:t>
             </a:fld>
             <a:endParaRPr lang="zh-TW" altLang="en-US"/>
           </a:p>
@@ -2990,7 +2989,7 @@
         <p:spPr>
           <a:xfrm>
             <a:off x="7467600" y="825500"/>
-            <a:ext cx="2082800" cy="1892300"/>
+            <a:ext cx="2346356" cy="1892300"/>
           </a:xfrm>
           <a:prstGeom prst="rect">
             <a:avLst/>
@@ -3028,14 +3027,7 @@
               <a:rPr lang="en-US" altLang="zh-TW" sz="3200" dirty="0" smtClean="0"/>
               <a:t>kernel</a:t>
             </a:r>
-          </a:p>
-          <a:p>
-            <a:pPr algn="ctr"/>
-            <a:r>
-              <a:rPr lang="en-US" altLang="zh-TW" sz="3200" dirty="0" smtClean="0"/>
-              <a:t>(Back end)</a:t>
-            </a:r>
-            <a:endParaRPr lang="zh-TW" altLang="en-US" sz="3200" dirty="0"/>
+            <a:endParaRPr lang="en-US" altLang="zh-TW" sz="3200" dirty="0" smtClean="0"/>
           </a:p>
         </p:txBody>
       </p:sp>
@@ -3077,16 +3069,13 @@
             <a:pPr algn="ctr"/>
             <a:r>
               <a:rPr lang="en-US" altLang="zh-TW" sz="3200" dirty="0" smtClean="0"/>
-              <a:t>WEB Site</a:t>
-            </a:r>
-          </a:p>
-          <a:p>
-            <a:pPr algn="ctr"/>
+              <a:t>WEB </a:t>
+            </a:r>
             <a:r>
               <a:rPr lang="en-US" altLang="zh-TW" sz="3200" dirty="0" smtClean="0"/>
-              <a:t>(Front end)</a:t>
-            </a:r>
-            <a:endParaRPr lang="zh-TW" altLang="en-US" sz="3200" dirty="0"/>
+              <a:t>Site</a:t>
+            </a:r>
+            <a:endParaRPr lang="en-US" altLang="zh-TW" sz="3200" dirty="0" smtClean="0"/>
           </a:p>
         </p:txBody>
       </p:sp>
@@ -3098,7 +3087,7 @@
         </p:nvSpPr>
         <p:spPr>
           <a:xfrm>
-            <a:off x="2628900" y="254000"/>
+            <a:off x="2463800" y="179169"/>
             <a:ext cx="939800" cy="646331"/>
           </a:xfrm>
           <a:prstGeom prst="rect">
@@ -3132,7 +3121,7 @@
         </p:nvSpPr>
         <p:spPr>
           <a:xfrm>
-            <a:off x="7569200" y="254000"/>
+            <a:off x="7564673" y="179167"/>
             <a:ext cx="939800" cy="646331"/>
           </a:xfrm>
           <a:prstGeom prst="rect">
@@ -3481,151 +3470,16 @@
           </a:fontRef>
         </p:style>
       </p:cxnSp>
-    </p:spTree>
-    <p:extLst>
-      <p:ext uri="{BB962C8B-B14F-4D97-AF65-F5344CB8AC3E}">
-        <p14:creationId xmlns:p14="http://schemas.microsoft.com/office/powerpoint/2010/main" val="3169048541"/>
-      </p:ext>
-    </p:extLst>
-  </p:cSld>
-  <p:clrMapOvr>
-    <a:masterClrMapping/>
-  </p:clrMapOvr>
-  <p:timing>
-    <p:tnLst>
-      <p:par>
-        <p:cTn id="1" dur="indefinite" restart="never" nodeType="tmRoot"/>
-      </p:par>
-    </p:tnLst>
-  </p:timing>
-</p:sld>
-</file>
-
-<file path=ppt/slides/slide2.xml><?xml version="1.0" encoding="utf-8"?>
-<p:sld xmlns:a="http://schemas.openxmlformats.org/drawingml/2006/main" xmlns:r="http://schemas.openxmlformats.org/officeDocument/2006/relationships" xmlns:p="http://schemas.openxmlformats.org/presentationml/2006/main">
-  <p:cSld>
-    <p:spTree>
-      <p:nvGrpSpPr>
-        <p:cNvPr id="1" name=""/>
-        <p:cNvGrpSpPr/>
-        <p:nvPr/>
-      </p:nvGrpSpPr>
-      <p:grpSpPr>
-        <a:xfrm>
-          <a:off x="0" y="0"/>
-          <a:ext cx="0" cy="0"/>
-          <a:chOff x="0" y="0"/>
-          <a:chExt cx="0" cy="0"/>
-        </a:xfrm>
-      </p:grpSpPr>
-      <p:sp>
-        <p:nvSpPr>
-          <p:cNvPr id="4" name="矩形 3"/>
-          <p:cNvSpPr/>
+      <p:sp>
+        <p:nvSpPr>
+          <p:cNvPr id="2" name="文字方塊 1"/>
+          <p:cNvSpPr txBox="1"/>
           <p:nvPr/>
         </p:nvSpPr>
         <p:spPr>
           <a:xfrm>
-            <a:off x="7467600" y="825500"/>
-            <a:ext cx="2082800" cy="1892300"/>
-          </a:xfrm>
-          <a:prstGeom prst="rect">
-            <a:avLst/>
-          </a:prstGeom>
-        </p:spPr>
-        <p:style>
-          <a:lnRef idx="2">
-            <a:schemeClr val="accent1">
-              <a:shade val="50000"/>
-            </a:schemeClr>
-          </a:lnRef>
-          <a:fillRef idx="1">
-            <a:schemeClr val="accent1"/>
-          </a:fillRef>
-          <a:effectRef idx="0">
-            <a:schemeClr val="accent1"/>
-          </a:effectRef>
-          <a:fontRef idx="minor">
-            <a:schemeClr val="lt1"/>
-          </a:fontRef>
-        </p:style>
-        <p:txBody>
-          <a:bodyPr rtlCol="0" anchor="ctr"/>
-          <a:lstStyle/>
-          <a:p>
-            <a:pPr algn="ctr"/>
-            <a:r>
-              <a:rPr lang="en-US" altLang="zh-TW" sz="3200" dirty="0" smtClean="0"/>
-              <a:t>ML inference</a:t>
-            </a:r>
-          </a:p>
-          <a:p>
-            <a:pPr algn="ctr"/>
-            <a:r>
-              <a:rPr lang="en-US" altLang="zh-TW" sz="3200" dirty="0" smtClean="0"/>
-              <a:t>kernel</a:t>
-            </a:r>
-          </a:p>
-        </p:txBody>
-      </p:sp>
-      <p:sp>
-        <p:nvSpPr>
-          <p:cNvPr id="5" name="矩形 4"/>
-          <p:cNvSpPr/>
-          <p:nvPr/>
-        </p:nvSpPr>
-        <p:spPr>
-          <a:xfrm>
-            <a:off x="2463800" y="825500"/>
-            <a:ext cx="2082800" cy="1892300"/>
-          </a:xfrm>
-          <a:prstGeom prst="rect">
-            <a:avLst/>
-          </a:prstGeom>
-        </p:spPr>
-        <p:style>
-          <a:lnRef idx="2">
-            <a:schemeClr val="accent1">
-              <a:shade val="50000"/>
-            </a:schemeClr>
-          </a:lnRef>
-          <a:fillRef idx="1">
-            <a:schemeClr val="accent1"/>
-          </a:fillRef>
-          <a:effectRef idx="0">
-            <a:schemeClr val="accent1"/>
-          </a:effectRef>
-          <a:fontRef idx="minor">
-            <a:schemeClr val="lt1"/>
-          </a:fontRef>
-        </p:style>
-        <p:txBody>
-          <a:bodyPr rtlCol="0" anchor="ctr"/>
-          <a:lstStyle/>
-          <a:p>
-            <a:pPr algn="ctr"/>
-            <a:r>
-              <a:rPr lang="en-US" altLang="zh-TW" sz="3200" dirty="0" smtClean="0"/>
-              <a:t>WEB </a:t>
-            </a:r>
-            <a:r>
-              <a:rPr lang="en-US" altLang="zh-TW" sz="3200" dirty="0" smtClean="0"/>
-              <a:t>Site</a:t>
-            </a:r>
-            <a:endParaRPr lang="en-US" altLang="zh-TW" sz="3200" dirty="0" smtClean="0"/>
-          </a:p>
-        </p:txBody>
-      </p:sp>
-      <p:sp>
-        <p:nvSpPr>
-          <p:cNvPr id="6" name="文字方塊 5"/>
-          <p:cNvSpPr txBox="1"/>
-          <p:nvPr/>
-        </p:nvSpPr>
-        <p:spPr>
-          <a:xfrm>
-            <a:off x="2628900" y="254000"/>
-            <a:ext cx="939800" cy="646331"/>
+            <a:off x="3432647" y="179169"/>
+            <a:ext cx="1304453" cy="646331"/>
           </a:xfrm>
           <a:prstGeom prst="rect">
             <a:avLst/>
@@ -3639,12 +3493,14 @@
           <a:lstStyle/>
           <a:p>
             <a:r>
-              <a:rPr lang="en-US" altLang="zh-TW" dirty="0" err="1" smtClean="0"/>
-              <a:t>docker</a:t>
-            </a:r>
-            <a:r>
               <a:rPr lang="en-US" altLang="zh-TW" dirty="0" smtClean="0"/>
-              <a:t> image</a:t>
+              <a:t>Port</a:t>
+            </a:r>
+          </a:p>
+          <a:p>
+            <a:r>
+              <a:rPr lang="en-US" altLang="zh-TW" dirty="0" smtClean="0"/>
+              <a:t>1234:1234</a:t>
             </a:r>
             <a:endParaRPr lang="zh-TW" altLang="en-US" dirty="0"/>
           </a:p>
@@ -3652,14 +3508,14 @@
       </p:sp>
       <p:sp>
         <p:nvSpPr>
-          <p:cNvPr id="7" name="文字方塊 6"/>
+          <p:cNvPr id="15" name="文字方塊 14"/>
           <p:cNvSpPr txBox="1"/>
           <p:nvPr/>
         </p:nvSpPr>
         <p:spPr>
           <a:xfrm>
-            <a:off x="7569200" y="254000"/>
-            <a:ext cx="939800" cy="646331"/>
+            <a:off x="8898173" y="179168"/>
+            <a:ext cx="1304453" cy="646331"/>
           </a:xfrm>
           <a:prstGeom prst="rect">
             <a:avLst/>
@@ -3673,12 +3529,14 @@
           <a:lstStyle/>
           <a:p>
             <a:r>
-              <a:rPr lang="en-US" altLang="zh-TW" dirty="0" err="1" smtClean="0"/>
-              <a:t>docker</a:t>
-            </a:r>
-            <a:r>
               <a:rPr lang="en-US" altLang="zh-TW" dirty="0" smtClean="0"/>
-              <a:t> image</a:t>
+              <a:t>Port</a:t>
+            </a:r>
+          </a:p>
+          <a:p>
+            <a:r>
+              <a:rPr lang="en-US" altLang="zh-TW" dirty="0" smtClean="0"/>
+              <a:t>5678:5678</a:t>
             </a:r>
             <a:endParaRPr lang="zh-TW" altLang="en-US" dirty="0"/>
           </a:p>
@@ -3686,152 +3544,14 @@
       </p:sp>
       <p:sp>
         <p:nvSpPr>
-          <p:cNvPr id="8" name="橢圓 7"/>
-          <p:cNvSpPr/>
+          <p:cNvPr id="3" name="文字方塊 2"/>
+          <p:cNvSpPr txBox="1"/>
           <p:nvPr/>
         </p:nvSpPr>
         <p:spPr>
           <a:xfrm>
-            <a:off x="5124450" y="673100"/>
-            <a:ext cx="1816100" cy="876300"/>
-          </a:xfrm>
-          <a:prstGeom prst="ellipse">
-            <a:avLst/>
-          </a:prstGeom>
-          <a:solidFill>
-            <a:schemeClr val="accent2"/>
-          </a:solidFill>
-        </p:spPr>
-        <p:style>
-          <a:lnRef idx="2">
-            <a:schemeClr val="accent1">
-              <a:shade val="50000"/>
-            </a:schemeClr>
-          </a:lnRef>
-          <a:fillRef idx="1">
-            <a:schemeClr val="accent1"/>
-          </a:fillRef>
-          <a:effectRef idx="0">
-            <a:schemeClr val="accent1"/>
-          </a:effectRef>
-          <a:fontRef idx="minor">
-            <a:schemeClr val="lt1"/>
-          </a:fontRef>
-        </p:style>
-        <p:txBody>
-          <a:bodyPr rtlCol="0" anchor="ctr"/>
-          <a:lstStyle/>
-          <a:p>
-            <a:pPr algn="ctr"/>
-            <a:r>
-              <a:rPr lang="en-US" altLang="zh-TW" dirty="0" smtClean="0"/>
-              <a:t>image</a:t>
-            </a:r>
-            <a:endParaRPr lang="zh-TW" altLang="en-US" dirty="0"/>
-          </a:p>
-        </p:txBody>
-      </p:sp>
-      <p:sp>
-        <p:nvSpPr>
-          <p:cNvPr id="9" name="橢圓 8"/>
-          <p:cNvSpPr/>
-          <p:nvPr/>
-        </p:nvSpPr>
-        <p:spPr>
-          <a:xfrm>
-            <a:off x="6559550" y="3260000"/>
-            <a:ext cx="1816100" cy="876300"/>
-          </a:xfrm>
-          <a:prstGeom prst="ellipse">
-            <a:avLst/>
-          </a:prstGeom>
-          <a:solidFill>
-            <a:schemeClr val="accent2"/>
-          </a:solidFill>
-        </p:spPr>
-        <p:style>
-          <a:lnRef idx="2">
-            <a:schemeClr val="accent1">
-              <a:shade val="50000"/>
-            </a:schemeClr>
-          </a:lnRef>
-          <a:fillRef idx="1">
-            <a:schemeClr val="accent1"/>
-          </a:fillRef>
-          <a:effectRef idx="0">
-            <a:schemeClr val="accent1"/>
-          </a:effectRef>
-          <a:fontRef idx="minor">
-            <a:schemeClr val="lt1"/>
-          </a:fontRef>
-        </p:style>
-        <p:txBody>
-          <a:bodyPr rtlCol="0" anchor="ctr"/>
-          <a:lstStyle/>
-          <a:p>
-            <a:pPr algn="ctr"/>
-            <a:r>
-              <a:rPr lang="en-US" altLang="zh-TW" dirty="0" smtClean="0"/>
-              <a:t>image</a:t>
-            </a:r>
-            <a:endParaRPr lang="zh-TW" altLang="en-US" dirty="0"/>
-          </a:p>
-        </p:txBody>
-      </p:sp>
-      <p:sp>
-        <p:nvSpPr>
-          <p:cNvPr id="10" name="矩形 9"/>
-          <p:cNvSpPr/>
-          <p:nvPr/>
-        </p:nvSpPr>
-        <p:spPr>
-          <a:xfrm>
-            <a:off x="7467600" y="4737100"/>
-            <a:ext cx="2082800" cy="1892300"/>
-          </a:xfrm>
-          <a:prstGeom prst="rect">
-            <a:avLst/>
-          </a:prstGeom>
-        </p:spPr>
-        <p:style>
-          <a:lnRef idx="2">
-            <a:schemeClr val="accent1">
-              <a:shade val="50000"/>
-            </a:schemeClr>
-          </a:lnRef>
-          <a:fillRef idx="1">
-            <a:schemeClr val="accent1"/>
-          </a:fillRef>
-          <a:effectRef idx="0">
-            <a:schemeClr val="accent1"/>
-          </a:effectRef>
-          <a:fontRef idx="minor">
-            <a:schemeClr val="lt1"/>
-          </a:fontRef>
-        </p:style>
-        <p:txBody>
-          <a:bodyPr rtlCol="0" anchor="ctr"/>
-          <a:lstStyle/>
-          <a:p>
-            <a:pPr algn="ctr"/>
-            <a:r>
-              <a:rPr lang="en-US" altLang="zh-TW" sz="3200" dirty="0" smtClean="0"/>
-              <a:t>local disk</a:t>
-            </a:r>
-            <a:endParaRPr lang="zh-TW" altLang="en-US" sz="3200" dirty="0"/>
-          </a:p>
-        </p:txBody>
-      </p:sp>
-      <p:sp>
-        <p:nvSpPr>
-          <p:cNvPr id="11" name="文字方塊 10"/>
-          <p:cNvSpPr txBox="1"/>
-          <p:nvPr/>
-        </p:nvSpPr>
-        <p:spPr>
-          <a:xfrm>
-            <a:off x="806450" y="1156384"/>
-            <a:ext cx="1130300" cy="646331"/>
+            <a:off x="2667251" y="2782669"/>
+            <a:ext cx="1930149" cy="646331"/>
           </a:xfrm>
           <a:prstGeom prst="rect">
             <a:avLst/>
@@ -3845,172 +3565,29 @@
           <a:lstStyle/>
           <a:p>
             <a:r>
-              <a:rPr lang="en-US" altLang="zh-TW" sz="3600" dirty="0" smtClean="0"/>
-              <a:t>User</a:t>
-            </a:r>
-            <a:endParaRPr lang="zh-TW" altLang="en-US" sz="3600" dirty="0"/>
-          </a:p>
-        </p:txBody>
-      </p:sp>
-      <p:cxnSp>
-        <p:nvCxnSpPr>
-          <p:cNvPr id="13" name="直線單箭頭接點 12"/>
-          <p:cNvCxnSpPr/>
-          <p:nvPr/>
-        </p:nvCxnSpPr>
-        <p:spPr>
-          <a:xfrm>
-            <a:off x="4927600" y="1689100"/>
-            <a:ext cx="2133600" cy="0"/>
-          </a:xfrm>
-          <a:prstGeom prst="straightConnector1">
-            <a:avLst/>
-          </a:prstGeom>
-          <a:ln>
-            <a:solidFill>
-              <a:schemeClr val="tx1"/>
-            </a:solidFill>
-            <a:tailEnd type="triangle"/>
-          </a:ln>
-        </p:spPr>
-        <p:style>
-          <a:lnRef idx="1">
-            <a:schemeClr val="accent1"/>
-          </a:lnRef>
-          <a:fillRef idx="0">
-            <a:schemeClr val="accent1"/>
-          </a:fillRef>
-          <a:effectRef idx="0">
-            <a:schemeClr val="accent1"/>
-          </a:effectRef>
-          <a:fontRef idx="minor">
-            <a:schemeClr val="tx1"/>
-          </a:fontRef>
-        </p:style>
-      </p:cxnSp>
-      <p:cxnSp>
-        <p:nvCxnSpPr>
-          <p:cNvPr id="14" name="直線單箭頭接點 13"/>
-          <p:cNvCxnSpPr/>
-          <p:nvPr/>
-        </p:nvCxnSpPr>
-        <p:spPr>
-          <a:xfrm flipH="1">
-            <a:off x="4933950" y="1943100"/>
-            <a:ext cx="2134800" cy="0"/>
-          </a:xfrm>
-          <a:prstGeom prst="straightConnector1">
-            <a:avLst/>
-          </a:prstGeom>
-          <a:ln>
-            <a:solidFill>
-              <a:schemeClr val="tx1"/>
-            </a:solidFill>
-            <a:tailEnd type="triangle"/>
-          </a:ln>
-        </p:spPr>
-        <p:style>
-          <a:lnRef idx="1">
-            <a:schemeClr val="accent1"/>
-          </a:lnRef>
-          <a:fillRef idx="0">
-            <a:schemeClr val="accent1"/>
-          </a:fillRef>
-          <a:effectRef idx="0">
-            <a:schemeClr val="accent1"/>
-          </a:effectRef>
-          <a:fontRef idx="minor">
-            <a:schemeClr val="tx1"/>
-          </a:fontRef>
-        </p:style>
-      </p:cxnSp>
-      <p:sp>
-        <p:nvSpPr>
-          <p:cNvPr id="16" name="橢圓 15"/>
-          <p:cNvSpPr/>
-          <p:nvPr/>
-        </p:nvSpPr>
-        <p:spPr>
-          <a:xfrm>
-            <a:off x="5124450" y="2025650"/>
-            <a:ext cx="1816100" cy="876300"/>
-          </a:xfrm>
-          <a:prstGeom prst="ellipse">
-            <a:avLst/>
-          </a:prstGeom>
-          <a:solidFill>
-            <a:schemeClr val="accent2"/>
-          </a:solidFill>
-        </p:spPr>
-        <p:style>
-          <a:lnRef idx="2">
-            <a:schemeClr val="accent1">
-              <a:shade val="50000"/>
-            </a:schemeClr>
-          </a:lnRef>
-          <a:fillRef idx="1">
-            <a:schemeClr val="accent1"/>
-          </a:fillRef>
-          <a:effectRef idx="0">
-            <a:schemeClr val="accent1"/>
-          </a:effectRef>
-          <a:fontRef idx="minor">
-            <a:schemeClr val="lt1"/>
-          </a:fontRef>
-        </p:style>
-        <p:txBody>
-          <a:bodyPr rtlCol="0" anchor="ctr"/>
-          <a:lstStyle/>
-          <a:p>
-            <a:pPr algn="ctr"/>
+              <a:rPr lang="zh-TW" altLang="en-US" dirty="0"/>
+              <a:t>會員身分</a:t>
+            </a:r>
+            <a:r>
+              <a:rPr lang="zh-TW" altLang="en-US" dirty="0" smtClean="0"/>
+              <a:t>驗證在</a:t>
+            </a:r>
             <a:r>
               <a:rPr lang="en-US" altLang="zh-TW" dirty="0" smtClean="0"/>
-              <a:t>predicted result</a:t>
+              <a:t>web site</a:t>
+            </a:r>
+            <a:r>
+              <a:rPr lang="zh-TW" altLang="en-US" dirty="0" smtClean="0"/>
+              <a:t>執行</a:t>
             </a:r>
             <a:endParaRPr lang="zh-TW" altLang="en-US" dirty="0"/>
           </a:p>
         </p:txBody>
       </p:sp>
-      <p:cxnSp>
-        <p:nvCxnSpPr>
-          <p:cNvPr id="17" name="直線單箭頭接點 16"/>
-          <p:cNvCxnSpPr/>
-          <p:nvPr/>
-        </p:nvCxnSpPr>
-        <p:spPr>
-          <a:xfrm flipH="1">
-            <a:off x="8572500" y="2978150"/>
-            <a:ext cx="0" cy="1440000"/>
-          </a:xfrm>
-          <a:prstGeom prst="straightConnector1">
-            <a:avLst/>
-          </a:prstGeom>
-          <a:ln>
-            <a:solidFill>
-              <a:schemeClr val="tx1"/>
-            </a:solidFill>
-            <a:tailEnd type="triangle"/>
-          </a:ln>
-        </p:spPr>
-        <p:style>
-          <a:lnRef idx="1">
-            <a:schemeClr val="accent1"/>
-          </a:lnRef>
-          <a:fillRef idx="0">
-            <a:schemeClr val="accent1"/>
-          </a:fillRef>
-          <a:effectRef idx="0">
-            <a:schemeClr val="accent1"/>
-          </a:effectRef>
-          <a:fontRef idx="minor">
-            <a:schemeClr val="tx1"/>
-          </a:fontRef>
-        </p:style>
-      </p:cxnSp>
     </p:spTree>
     <p:extLst>
       <p:ext uri="{BB962C8B-B14F-4D97-AF65-F5344CB8AC3E}">
-        <p14:creationId xmlns:p14="http://schemas.microsoft.com/office/powerpoint/2010/main" val="859059499"/>
+        <p14:creationId xmlns:p14="http://schemas.microsoft.com/office/powerpoint/2010/main" val="3169048541"/>
       </p:ext>
     </p:extLst>
   </p:cSld>

</xml_diff>